<commit_message>
extemded rough flow chart
</commit_message>
<xml_diff>
--- a/latex/graphics/rough_flow.pptx
+++ b/latex/graphics/rough_flow.pptx
@@ -53,7 +53,7 @@
       </p:grpSpPr>
       <p:sp>
         <p:nvSpPr>
-          <p:cNvPr id="26" name="PlaceHolder 1"/>
+          <p:cNvPr id="23" name="PlaceHolder 1"/>
           <p:cNvSpPr>
             <a:spLocks noGrp="1"/>
           </p:cNvSpPr>
@@ -64,7 +64,7 @@
         <p:spPr>
           <a:xfrm>
             <a:off x="504000" y="301320"/>
-            <a:ext cx="9071640" cy="1262160"/>
+            <a:ext cx="9071280" cy="1261800"/>
           </a:xfrm>
           <a:prstGeom prst="rect">
             <a:avLst/>
@@ -90,7 +90,7 @@
       </p:sp>
       <p:sp>
         <p:nvSpPr>
-          <p:cNvPr id="27" name="PlaceHolder 2"/>
+          <p:cNvPr id="24" name="PlaceHolder 2"/>
           <p:cNvSpPr>
             <a:spLocks noGrp="1"/>
           </p:cNvSpPr>
@@ -100,8 +100,8 @@
         </p:nvSpPr>
         <p:spPr>
           <a:xfrm>
-            <a:off x="504000" y="1769040"/>
-            <a:ext cx="9071640" cy="2091240"/>
+            <a:off x="504000" y="1768680"/>
+            <a:ext cx="9072000" cy="2090880"/>
           </a:xfrm>
           <a:prstGeom prst="rect">
             <a:avLst/>
@@ -126,7 +126,7 @@
       </p:sp>
       <p:sp>
         <p:nvSpPr>
-          <p:cNvPr id="28" name="PlaceHolder 3"/>
+          <p:cNvPr id="25" name="PlaceHolder 3"/>
           <p:cNvSpPr>
             <a:spLocks noGrp="1"/>
           </p:cNvSpPr>
@@ -136,8 +136,8 @@
         </p:nvSpPr>
         <p:spPr>
           <a:xfrm>
-            <a:off x="504000" y="4059360"/>
-            <a:ext cx="9071640" cy="2091240"/>
+            <a:off x="504000" y="4058640"/>
+            <a:ext cx="9072000" cy="2090880"/>
           </a:xfrm>
           <a:prstGeom prst="rect">
             <a:avLst/>
@@ -184,7 +184,7 @@
       </p:grpSpPr>
       <p:sp>
         <p:nvSpPr>
-          <p:cNvPr id="29" name="PlaceHolder 1"/>
+          <p:cNvPr id="26" name="PlaceHolder 1"/>
           <p:cNvSpPr>
             <a:spLocks noGrp="1"/>
           </p:cNvSpPr>
@@ -195,7 +195,7 @@
         <p:spPr>
           <a:xfrm>
             <a:off x="504000" y="301320"/>
-            <a:ext cx="9071640" cy="1262160"/>
+            <a:ext cx="9071280" cy="1261800"/>
           </a:xfrm>
           <a:prstGeom prst="rect">
             <a:avLst/>
@@ -221,7 +221,7 @@
       </p:sp>
       <p:sp>
         <p:nvSpPr>
-          <p:cNvPr id="30" name="PlaceHolder 2"/>
+          <p:cNvPr id="27" name="PlaceHolder 2"/>
           <p:cNvSpPr>
             <a:spLocks noGrp="1"/>
           </p:cNvSpPr>
@@ -231,8 +231,8 @@
         </p:nvSpPr>
         <p:spPr>
           <a:xfrm>
-            <a:off x="504000" y="1769040"/>
-            <a:ext cx="4426920" cy="2091240"/>
+            <a:off x="504000" y="1768680"/>
+            <a:ext cx="4426920" cy="2090880"/>
           </a:xfrm>
           <a:prstGeom prst="rect">
             <a:avLst/>
@@ -257,7 +257,7 @@
       </p:sp>
       <p:sp>
         <p:nvSpPr>
-          <p:cNvPr id="31" name="PlaceHolder 3"/>
+          <p:cNvPr id="28" name="PlaceHolder 3"/>
           <p:cNvSpPr>
             <a:spLocks noGrp="1"/>
           </p:cNvSpPr>
@@ -267,8 +267,8 @@
         </p:nvSpPr>
         <p:spPr>
           <a:xfrm>
-            <a:off x="5152680" y="1769040"/>
-            <a:ext cx="4426920" cy="2091240"/>
+            <a:off x="5152680" y="1768680"/>
+            <a:ext cx="4426920" cy="2090880"/>
           </a:xfrm>
           <a:prstGeom prst="rect">
             <a:avLst/>
@@ -293,7 +293,7 @@
       </p:sp>
       <p:sp>
         <p:nvSpPr>
-          <p:cNvPr id="32" name="PlaceHolder 4"/>
+          <p:cNvPr id="29" name="PlaceHolder 4"/>
           <p:cNvSpPr>
             <a:spLocks noGrp="1"/>
           </p:cNvSpPr>
@@ -303,8 +303,8 @@
         </p:nvSpPr>
         <p:spPr>
           <a:xfrm>
-            <a:off x="5152680" y="4059360"/>
-            <a:ext cx="4426920" cy="2091240"/>
+            <a:off x="5152680" y="4058640"/>
+            <a:ext cx="4426920" cy="2090880"/>
           </a:xfrm>
           <a:prstGeom prst="rect">
             <a:avLst/>
@@ -329,7 +329,7 @@
       </p:sp>
       <p:sp>
         <p:nvSpPr>
-          <p:cNvPr id="33" name="PlaceHolder 5"/>
+          <p:cNvPr id="30" name="PlaceHolder 5"/>
           <p:cNvSpPr>
             <a:spLocks noGrp="1"/>
           </p:cNvSpPr>
@@ -339,8 +339,8 @@
         </p:nvSpPr>
         <p:spPr>
           <a:xfrm>
-            <a:off x="504000" y="4059360"/>
-            <a:ext cx="4426920" cy="2091240"/>
+            <a:off x="504000" y="4058640"/>
+            <a:ext cx="4426920" cy="2090880"/>
           </a:xfrm>
           <a:prstGeom prst="rect">
             <a:avLst/>
@@ -387,7 +387,7 @@
       </p:grpSpPr>
       <p:sp>
         <p:nvSpPr>
-          <p:cNvPr id="34" name="PlaceHolder 1"/>
+          <p:cNvPr id="31" name="PlaceHolder 1"/>
           <p:cNvSpPr>
             <a:spLocks noGrp="1"/>
           </p:cNvSpPr>
@@ -398,7 +398,7 @@
         <p:spPr>
           <a:xfrm>
             <a:off x="504000" y="301320"/>
-            <a:ext cx="9071640" cy="1262160"/>
+            <a:ext cx="9071280" cy="1261800"/>
           </a:xfrm>
           <a:prstGeom prst="rect">
             <a:avLst/>
@@ -424,7 +424,7 @@
       </p:sp>
       <p:sp>
         <p:nvSpPr>
-          <p:cNvPr id="35" name="PlaceHolder 2"/>
+          <p:cNvPr id="32" name="PlaceHolder 2"/>
           <p:cNvSpPr>
             <a:spLocks noGrp="1"/>
           </p:cNvSpPr>
@@ -434,8 +434,8 @@
         </p:nvSpPr>
         <p:spPr>
           <a:xfrm>
-            <a:off x="504000" y="1769040"/>
-            <a:ext cx="9071640" cy="4384440"/>
+            <a:off x="504000" y="1768680"/>
+            <a:ext cx="9072000" cy="4384080"/>
           </a:xfrm>
           <a:prstGeom prst="rect">
             <a:avLst/>
@@ -460,7 +460,7 @@
       </p:sp>
       <p:sp>
         <p:nvSpPr>
-          <p:cNvPr id="36" name="PlaceHolder 3"/>
+          <p:cNvPr id="33" name="PlaceHolder 3"/>
           <p:cNvSpPr>
             <a:spLocks noGrp="1"/>
           </p:cNvSpPr>
@@ -470,8 +470,8 @@
         </p:nvSpPr>
         <p:spPr>
           <a:xfrm>
-            <a:off x="504000" y="1769040"/>
-            <a:ext cx="9071640" cy="4384440"/>
+            <a:off x="504000" y="1768680"/>
+            <a:ext cx="9072000" cy="4384080"/>
           </a:xfrm>
           <a:prstGeom prst="rect">
             <a:avLst/>
@@ -496,7 +496,7 @@
       </p:sp>
       <p:pic>
         <p:nvPicPr>
-          <p:cNvPr id="37" name="" descr=""/>
+          <p:cNvPr id="34" name="" descr=""/>
           <p:cNvPicPr/>
           <p:nvPr/>
         </p:nvPicPr>
@@ -506,20 +506,20 @@
         </p:blipFill>
         <p:spPr>
           <a:xfrm>
-            <a:off x="2292120" y="1768680"/>
-            <a:ext cx="5495040" cy="4384440"/>
-          </a:xfrm>
-          <a:prstGeom prst="rect">
-            <a:avLst/>
-          </a:prstGeom>
-          <a:ln w="18360">
+            <a:off x="2292480" y="1768680"/>
+            <a:ext cx="5494680" cy="4384080"/>
+          </a:xfrm>
+          <a:prstGeom prst="rect">
+            <a:avLst/>
+          </a:prstGeom>
+          <a:ln>
             <a:noFill/>
           </a:ln>
         </p:spPr>
       </p:pic>
       <p:pic>
         <p:nvPicPr>
-          <p:cNvPr id="38" name="" descr=""/>
+          <p:cNvPr id="35" name="" descr=""/>
           <p:cNvPicPr/>
           <p:nvPr/>
         </p:nvPicPr>
@@ -529,13 +529,13 @@
         </p:blipFill>
         <p:spPr>
           <a:xfrm>
-            <a:off x="2292120" y="1768680"/>
-            <a:ext cx="5495040" cy="4384440"/>
-          </a:xfrm>
-          <a:prstGeom prst="rect">
-            <a:avLst/>
-          </a:prstGeom>
-          <a:ln w="18360">
+            <a:off x="2292480" y="1768680"/>
+            <a:ext cx="5494680" cy="4384080"/>
+          </a:xfrm>
+          <a:prstGeom prst="rect">
+            <a:avLst/>
+          </a:prstGeom>
+          <a:ln>
             <a:noFill/>
           </a:ln>
         </p:spPr>
@@ -564,7 +564,7 @@
       </p:grpSpPr>
       <p:sp>
         <p:nvSpPr>
-          <p:cNvPr id="5" name="PlaceHolder 1"/>
+          <p:cNvPr id="2" name="PlaceHolder 1"/>
           <p:cNvSpPr>
             <a:spLocks noGrp="1"/>
           </p:cNvSpPr>
@@ -575,7 +575,7 @@
         <p:spPr>
           <a:xfrm>
             <a:off x="504000" y="301320"/>
-            <a:ext cx="9071640" cy="1262160"/>
+            <a:ext cx="9071280" cy="1261800"/>
           </a:xfrm>
           <a:prstGeom prst="rect">
             <a:avLst/>
@@ -601,7 +601,7 @@
       </p:sp>
       <p:sp>
         <p:nvSpPr>
-          <p:cNvPr id="6" name="PlaceHolder 2"/>
+          <p:cNvPr id="3" name="PlaceHolder 2"/>
           <p:cNvSpPr>
             <a:spLocks noGrp="1"/>
           </p:cNvSpPr>
@@ -611,8 +611,8 @@
         </p:nvSpPr>
         <p:spPr>
           <a:xfrm>
-            <a:off x="504000" y="1769040"/>
-            <a:ext cx="9071640" cy="4384440"/>
+            <a:off x="504000" y="1768680"/>
+            <a:ext cx="9072000" cy="4384080"/>
           </a:xfrm>
           <a:prstGeom prst="rect">
             <a:avLst/>
@@ -660,7 +660,7 @@
       </p:grpSpPr>
       <p:sp>
         <p:nvSpPr>
-          <p:cNvPr id="7" name="PlaceHolder 1"/>
+          <p:cNvPr id="4" name="PlaceHolder 1"/>
           <p:cNvSpPr>
             <a:spLocks noGrp="1"/>
           </p:cNvSpPr>
@@ -671,7 +671,7 @@
         <p:spPr>
           <a:xfrm>
             <a:off x="504000" y="301320"/>
-            <a:ext cx="9071640" cy="1262160"/>
+            <a:ext cx="9071280" cy="1261800"/>
           </a:xfrm>
           <a:prstGeom prst="rect">
             <a:avLst/>
@@ -697,7 +697,7 @@
       </p:sp>
       <p:sp>
         <p:nvSpPr>
-          <p:cNvPr id="8" name="PlaceHolder 2"/>
+          <p:cNvPr id="5" name="PlaceHolder 2"/>
           <p:cNvSpPr>
             <a:spLocks noGrp="1"/>
           </p:cNvSpPr>
@@ -707,8 +707,8 @@
         </p:nvSpPr>
         <p:spPr>
           <a:xfrm>
-            <a:off x="504000" y="1769040"/>
-            <a:ext cx="9071640" cy="4384440"/>
+            <a:off x="504000" y="1768680"/>
+            <a:ext cx="9072000" cy="4384080"/>
           </a:xfrm>
           <a:prstGeom prst="rect">
             <a:avLst/>
@@ -755,7 +755,7 @@
       </p:grpSpPr>
       <p:sp>
         <p:nvSpPr>
-          <p:cNvPr id="9" name="PlaceHolder 1"/>
+          <p:cNvPr id="6" name="PlaceHolder 1"/>
           <p:cNvSpPr>
             <a:spLocks noGrp="1"/>
           </p:cNvSpPr>
@@ -766,7 +766,7 @@
         <p:spPr>
           <a:xfrm>
             <a:off x="504000" y="301320"/>
-            <a:ext cx="9071640" cy="1262160"/>
+            <a:ext cx="9071280" cy="1261800"/>
           </a:xfrm>
           <a:prstGeom prst="rect">
             <a:avLst/>
@@ -792,7 +792,7 @@
       </p:sp>
       <p:sp>
         <p:nvSpPr>
-          <p:cNvPr id="10" name="PlaceHolder 2"/>
+          <p:cNvPr id="7" name="PlaceHolder 2"/>
           <p:cNvSpPr>
             <a:spLocks noGrp="1"/>
           </p:cNvSpPr>
@@ -802,8 +802,8 @@
         </p:nvSpPr>
         <p:spPr>
           <a:xfrm>
-            <a:off x="504000" y="1769040"/>
-            <a:ext cx="4426920" cy="4384440"/>
+            <a:off x="504000" y="1768680"/>
+            <a:ext cx="4426920" cy="4384080"/>
           </a:xfrm>
           <a:prstGeom prst="rect">
             <a:avLst/>
@@ -828,7 +828,7 @@
       </p:sp>
       <p:sp>
         <p:nvSpPr>
-          <p:cNvPr id="11" name="PlaceHolder 3"/>
+          <p:cNvPr id="8" name="PlaceHolder 3"/>
           <p:cNvSpPr>
             <a:spLocks noGrp="1"/>
           </p:cNvSpPr>
@@ -838,8 +838,8 @@
         </p:nvSpPr>
         <p:spPr>
           <a:xfrm>
-            <a:off x="5152680" y="1769040"/>
-            <a:ext cx="4426920" cy="4384440"/>
+            <a:off x="5152680" y="1768680"/>
+            <a:ext cx="4426920" cy="4384080"/>
           </a:xfrm>
           <a:prstGeom prst="rect">
             <a:avLst/>
@@ -886,7 +886,7 @@
       </p:grpSpPr>
       <p:sp>
         <p:nvSpPr>
-          <p:cNvPr id="12" name="PlaceHolder 1"/>
+          <p:cNvPr id="9" name="PlaceHolder 1"/>
           <p:cNvSpPr>
             <a:spLocks noGrp="1"/>
           </p:cNvSpPr>
@@ -897,7 +897,7 @@
         <p:spPr>
           <a:xfrm>
             <a:off x="504000" y="301320"/>
-            <a:ext cx="9071640" cy="1262160"/>
+            <a:ext cx="9071280" cy="1261800"/>
           </a:xfrm>
           <a:prstGeom prst="rect">
             <a:avLst/>
@@ -945,7 +945,7 @@
       </p:grpSpPr>
       <p:sp>
         <p:nvSpPr>
-          <p:cNvPr id="13" name="PlaceHolder 1"/>
+          <p:cNvPr id="10" name="PlaceHolder 1"/>
           <p:cNvSpPr>
             <a:spLocks noGrp="1"/>
           </p:cNvSpPr>
@@ -956,7 +956,7 @@
         <p:spPr>
           <a:xfrm>
             <a:off x="504000" y="301320"/>
-            <a:ext cx="9071640" cy="5851800"/>
+            <a:ext cx="9071280" cy="5850360"/>
           </a:xfrm>
           <a:prstGeom prst="rect">
             <a:avLst/>
@@ -1004,7 +1004,7 @@
       </p:grpSpPr>
       <p:sp>
         <p:nvSpPr>
-          <p:cNvPr id="14" name="PlaceHolder 1"/>
+          <p:cNvPr id="11" name="PlaceHolder 1"/>
           <p:cNvSpPr>
             <a:spLocks noGrp="1"/>
           </p:cNvSpPr>
@@ -1015,7 +1015,7 @@
         <p:spPr>
           <a:xfrm>
             <a:off x="504000" y="301320"/>
-            <a:ext cx="9071640" cy="1262160"/>
+            <a:ext cx="9071280" cy="1261800"/>
           </a:xfrm>
           <a:prstGeom prst="rect">
             <a:avLst/>
@@ -1041,7 +1041,7 @@
       </p:sp>
       <p:sp>
         <p:nvSpPr>
-          <p:cNvPr id="15" name="PlaceHolder 2"/>
+          <p:cNvPr id="12" name="PlaceHolder 2"/>
           <p:cNvSpPr>
             <a:spLocks noGrp="1"/>
           </p:cNvSpPr>
@@ -1051,8 +1051,8 @@
         </p:nvSpPr>
         <p:spPr>
           <a:xfrm>
-            <a:off x="504000" y="1769040"/>
-            <a:ext cx="4426920" cy="2091240"/>
+            <a:off x="504000" y="1768680"/>
+            <a:ext cx="4426920" cy="2090880"/>
           </a:xfrm>
           <a:prstGeom prst="rect">
             <a:avLst/>
@@ -1077,7 +1077,7 @@
       </p:sp>
       <p:sp>
         <p:nvSpPr>
-          <p:cNvPr id="16" name="PlaceHolder 3"/>
+          <p:cNvPr id="13" name="PlaceHolder 3"/>
           <p:cNvSpPr>
             <a:spLocks noGrp="1"/>
           </p:cNvSpPr>
@@ -1087,8 +1087,8 @@
         </p:nvSpPr>
         <p:spPr>
           <a:xfrm>
-            <a:off x="504000" y="4059360"/>
-            <a:ext cx="4426920" cy="2091240"/>
+            <a:off x="504000" y="4058640"/>
+            <a:ext cx="4426920" cy="2090880"/>
           </a:xfrm>
           <a:prstGeom prst="rect">
             <a:avLst/>
@@ -1113,7 +1113,7 @@
       </p:sp>
       <p:sp>
         <p:nvSpPr>
-          <p:cNvPr id="17" name="PlaceHolder 4"/>
+          <p:cNvPr id="14" name="PlaceHolder 4"/>
           <p:cNvSpPr>
             <a:spLocks noGrp="1"/>
           </p:cNvSpPr>
@@ -1123,8 +1123,8 @@
         </p:nvSpPr>
         <p:spPr>
           <a:xfrm>
-            <a:off x="5152680" y="1769040"/>
-            <a:ext cx="4426920" cy="4384440"/>
+            <a:off x="5152680" y="1768680"/>
+            <a:ext cx="4426920" cy="4384080"/>
           </a:xfrm>
           <a:prstGeom prst="rect">
             <a:avLst/>
@@ -1171,7 +1171,7 @@
       </p:grpSpPr>
       <p:sp>
         <p:nvSpPr>
-          <p:cNvPr id="18" name="PlaceHolder 1"/>
+          <p:cNvPr id="15" name="PlaceHolder 1"/>
           <p:cNvSpPr>
             <a:spLocks noGrp="1"/>
           </p:cNvSpPr>
@@ -1182,7 +1182,7 @@
         <p:spPr>
           <a:xfrm>
             <a:off x="504000" y="301320"/>
-            <a:ext cx="9071640" cy="1262160"/>
+            <a:ext cx="9071280" cy="1261800"/>
           </a:xfrm>
           <a:prstGeom prst="rect">
             <a:avLst/>
@@ -1208,7 +1208,7 @@
       </p:sp>
       <p:sp>
         <p:nvSpPr>
-          <p:cNvPr id="19" name="PlaceHolder 2"/>
+          <p:cNvPr id="16" name="PlaceHolder 2"/>
           <p:cNvSpPr>
             <a:spLocks noGrp="1"/>
           </p:cNvSpPr>
@@ -1218,8 +1218,8 @@
         </p:nvSpPr>
         <p:spPr>
           <a:xfrm>
-            <a:off x="504000" y="1769040"/>
-            <a:ext cx="4426920" cy="4384440"/>
+            <a:off x="504000" y="1768680"/>
+            <a:ext cx="4426920" cy="4384080"/>
           </a:xfrm>
           <a:prstGeom prst="rect">
             <a:avLst/>
@@ -1244,7 +1244,7 @@
       </p:sp>
       <p:sp>
         <p:nvSpPr>
-          <p:cNvPr id="20" name="PlaceHolder 3"/>
+          <p:cNvPr id="17" name="PlaceHolder 3"/>
           <p:cNvSpPr>
             <a:spLocks noGrp="1"/>
           </p:cNvSpPr>
@@ -1254,8 +1254,8 @@
         </p:nvSpPr>
         <p:spPr>
           <a:xfrm>
-            <a:off x="5152680" y="1769040"/>
-            <a:ext cx="4426920" cy="2091240"/>
+            <a:off x="5152680" y="1768680"/>
+            <a:ext cx="4426920" cy="2090880"/>
           </a:xfrm>
           <a:prstGeom prst="rect">
             <a:avLst/>
@@ -1280,7 +1280,7 @@
       </p:sp>
       <p:sp>
         <p:nvSpPr>
-          <p:cNvPr id="21" name="PlaceHolder 4"/>
+          <p:cNvPr id="18" name="PlaceHolder 4"/>
           <p:cNvSpPr>
             <a:spLocks noGrp="1"/>
           </p:cNvSpPr>
@@ -1290,8 +1290,8 @@
         </p:nvSpPr>
         <p:spPr>
           <a:xfrm>
-            <a:off x="5152680" y="4059360"/>
-            <a:ext cx="4426920" cy="2091240"/>
+            <a:off x="5152680" y="4058640"/>
+            <a:ext cx="4426920" cy="2090880"/>
           </a:xfrm>
           <a:prstGeom prst="rect">
             <a:avLst/>
@@ -1338,7 +1338,7 @@
       </p:grpSpPr>
       <p:sp>
         <p:nvSpPr>
-          <p:cNvPr id="22" name="PlaceHolder 1"/>
+          <p:cNvPr id="19" name="PlaceHolder 1"/>
           <p:cNvSpPr>
             <a:spLocks noGrp="1"/>
           </p:cNvSpPr>
@@ -1349,7 +1349,7 @@
         <p:spPr>
           <a:xfrm>
             <a:off x="504000" y="301320"/>
-            <a:ext cx="9071640" cy="1262160"/>
+            <a:ext cx="9071280" cy="1261800"/>
           </a:xfrm>
           <a:prstGeom prst="rect">
             <a:avLst/>
@@ -1375,7 +1375,7 @@
       </p:sp>
       <p:sp>
         <p:nvSpPr>
-          <p:cNvPr id="23" name="PlaceHolder 2"/>
+          <p:cNvPr id="20" name="PlaceHolder 2"/>
           <p:cNvSpPr>
             <a:spLocks noGrp="1"/>
           </p:cNvSpPr>
@@ -1385,8 +1385,8 @@
         </p:nvSpPr>
         <p:spPr>
           <a:xfrm>
-            <a:off x="504000" y="1769040"/>
-            <a:ext cx="4426920" cy="2091240"/>
+            <a:off x="504000" y="1768680"/>
+            <a:ext cx="4426920" cy="2090880"/>
           </a:xfrm>
           <a:prstGeom prst="rect">
             <a:avLst/>
@@ -1411,7 +1411,7 @@
       </p:sp>
       <p:sp>
         <p:nvSpPr>
-          <p:cNvPr id="24" name="PlaceHolder 3"/>
+          <p:cNvPr id="21" name="PlaceHolder 3"/>
           <p:cNvSpPr>
             <a:spLocks noGrp="1"/>
           </p:cNvSpPr>
@@ -1421,8 +1421,8 @@
         </p:nvSpPr>
         <p:spPr>
           <a:xfrm>
-            <a:off x="5152680" y="1769040"/>
-            <a:ext cx="4426920" cy="2091240"/>
+            <a:off x="5152680" y="1768680"/>
+            <a:ext cx="4426920" cy="2090880"/>
           </a:xfrm>
           <a:prstGeom prst="rect">
             <a:avLst/>
@@ -1447,7 +1447,7 @@
       </p:sp>
       <p:sp>
         <p:nvSpPr>
-          <p:cNvPr id="25" name="PlaceHolder 4"/>
+          <p:cNvPr id="22" name="PlaceHolder 4"/>
           <p:cNvSpPr>
             <a:spLocks noGrp="1"/>
           </p:cNvSpPr>
@@ -1457,8 +1457,8 @@
         </p:nvSpPr>
         <p:spPr>
           <a:xfrm>
-            <a:off x="504000" y="4059360"/>
-            <a:ext cx="9071640" cy="2091240"/>
+            <a:off x="504000" y="4058640"/>
+            <a:ext cx="9072000" cy="2090880"/>
           </a:xfrm>
           <a:prstGeom prst="rect">
             <a:avLst/>
@@ -1516,7 +1516,7 @@
         <p:spPr>
           <a:xfrm>
             <a:off x="504000" y="301320"/>
-            <a:ext cx="9071640" cy="1262160"/>
+            <a:ext cx="9071280" cy="1261800"/>
           </a:xfrm>
           <a:prstGeom prst="rect">
             <a:avLst/>
@@ -1526,20 +1526,6 @@
           <a:bodyPr lIns="0" rIns="0" tIns="0" bIns="0" anchor="ctr"/>
           <a:p>
             <a:pPr algn="ctr"/>
-            <a:r>
-              <a:rPr b="0" lang="en-US" sz="4400" spc="-1" strike="noStrike">
-                <a:solidFill>
-                  <a:srgbClr val="000000"/>
-                </a:solidFill>
-                <a:uFill>
-                  <a:solidFill>
-                    <a:srgbClr val="ffffff"/>
-                  </a:solidFill>
-                </a:uFill>
-                <a:latin typeface="Arial"/>
-              </a:rPr>
-              <a:t>Click to edit the title text format</a:t>
-            </a:r>
             <a:endParaRPr b="0" lang="en-US" sz="4400" spc="-1" strike="noStrike">
               <a:solidFill>
                 <a:srgbClr val="000000"/>
@@ -1566,8 +1552,8 @@
         </p:nvSpPr>
         <p:spPr>
           <a:xfrm>
-            <a:off x="504000" y="1769040"/>
-            <a:ext cx="9071640" cy="4384440"/>
+            <a:off x="504000" y="1768680"/>
+            <a:ext cx="9072000" cy="4384080"/>
           </a:xfrm>
           <a:prstGeom prst="rect">
             <a:avLst/>
@@ -1818,158 +1804,6 @@
                 </a:solidFill>
               </a:uFill>
               <a:latin typeface="Arial"/>
-            </a:endParaRPr>
-          </a:p>
-        </p:txBody>
-      </p:sp>
-      <p:sp>
-        <p:nvSpPr>
-          <p:cNvPr id="2" name="PlaceHolder 3"/>
-          <p:cNvSpPr>
-            <a:spLocks noGrp="1"/>
-          </p:cNvSpPr>
-          <p:nvPr>
-            <p:ph type="dt"/>
-          </p:nvPr>
-        </p:nvSpPr>
-        <p:spPr>
-          <a:xfrm>
-            <a:off x="504000" y="6887160"/>
-            <a:ext cx="2348280" cy="521280"/>
-          </a:xfrm>
-          <a:prstGeom prst="rect">
-            <a:avLst/>
-          </a:prstGeom>
-        </p:spPr>
-        <p:txBody>
-          <a:bodyPr lIns="0" rIns="0" tIns="0" bIns="0"/>
-          <a:p>
-            <a:r>
-              <a:rPr b="0" lang="en-US" sz="1400" spc="-1" strike="noStrike">
-                <a:solidFill>
-                  <a:srgbClr val="000000"/>
-                </a:solidFill>
-                <a:uFill>
-                  <a:solidFill>
-                    <a:srgbClr val="ffffff"/>
-                  </a:solidFill>
-                </a:uFill>
-                <a:latin typeface="Times New Roman"/>
-              </a:rPr>
-              <a:t>&lt;date/time&gt;</a:t>
-            </a:r>
-            <a:endParaRPr b="0" lang="en-US" sz="1400" spc="-1" strike="noStrike">
-              <a:solidFill>
-                <a:srgbClr val="000000"/>
-              </a:solidFill>
-              <a:uFill>
-                <a:solidFill>
-                  <a:srgbClr val="ffffff"/>
-                </a:solidFill>
-              </a:uFill>
-              <a:latin typeface="Times New Roman"/>
-            </a:endParaRPr>
-          </a:p>
-        </p:txBody>
-      </p:sp>
-      <p:sp>
-        <p:nvSpPr>
-          <p:cNvPr id="3" name="PlaceHolder 4"/>
-          <p:cNvSpPr>
-            <a:spLocks noGrp="1"/>
-          </p:cNvSpPr>
-          <p:nvPr>
-            <p:ph type="ftr"/>
-          </p:nvPr>
-        </p:nvSpPr>
-        <p:spPr>
-          <a:xfrm>
-            <a:off x="3447360" y="6887160"/>
-            <a:ext cx="3195000" cy="521280"/>
-          </a:xfrm>
-          <a:prstGeom prst="rect">
-            <a:avLst/>
-          </a:prstGeom>
-        </p:spPr>
-        <p:txBody>
-          <a:bodyPr lIns="0" rIns="0" tIns="0" bIns="0"/>
-          <a:p>
-            <a:pPr algn="ctr"/>
-            <a:r>
-              <a:rPr b="0" lang="en-US" sz="1400" spc="-1" strike="noStrike">
-                <a:solidFill>
-                  <a:srgbClr val="000000"/>
-                </a:solidFill>
-                <a:uFill>
-                  <a:solidFill>
-                    <a:srgbClr val="ffffff"/>
-                  </a:solidFill>
-                </a:uFill>
-                <a:latin typeface="Times New Roman"/>
-              </a:rPr>
-              <a:t>&lt;footer&gt;</a:t>
-            </a:r>
-            <a:endParaRPr b="0" lang="en-US" sz="1400" spc="-1" strike="noStrike">
-              <a:solidFill>
-                <a:srgbClr val="000000"/>
-              </a:solidFill>
-              <a:uFill>
-                <a:solidFill>
-                  <a:srgbClr val="ffffff"/>
-                </a:solidFill>
-              </a:uFill>
-              <a:latin typeface="Times New Roman"/>
-            </a:endParaRPr>
-          </a:p>
-        </p:txBody>
-      </p:sp>
-      <p:sp>
-        <p:nvSpPr>
-          <p:cNvPr id="4" name="PlaceHolder 5"/>
-          <p:cNvSpPr>
-            <a:spLocks noGrp="1"/>
-          </p:cNvSpPr>
-          <p:nvPr>
-            <p:ph type="sldNum"/>
-          </p:nvPr>
-        </p:nvSpPr>
-        <p:spPr>
-          <a:xfrm>
-            <a:off x="7227360" y="6887160"/>
-            <a:ext cx="2348280" cy="521280"/>
-          </a:xfrm>
-          <a:prstGeom prst="rect">
-            <a:avLst/>
-          </a:prstGeom>
-        </p:spPr>
-        <p:txBody>
-          <a:bodyPr lIns="0" rIns="0" tIns="0" bIns="0"/>
-          <a:p>
-            <a:pPr algn="r"/>
-            <a:fld id="{7E3E65CC-F77C-4EEF-8123-5D13909326AF}" type="slidenum">
-              <a:rPr b="0" lang="en-US" sz="1400" spc="-1" strike="noStrike">
-                <a:solidFill>
-                  <a:srgbClr val="000000"/>
-                </a:solidFill>
-                <a:uFill>
-                  <a:solidFill>
-                    <a:srgbClr val="ffffff"/>
-                  </a:solidFill>
-                </a:uFill>
-                <a:latin typeface="Times New Roman"/>
-              </a:rPr>
-              <a:t>&lt;number&gt;</a:t>
-            </a:fld>
-            <a:endParaRPr b="0" lang="en-US" sz="1400" spc="-1" strike="noStrike">
-              <a:solidFill>
-                <a:srgbClr val="000000"/>
-              </a:solidFill>
-              <a:uFill>
-                <a:solidFill>
-                  <a:srgbClr val="ffffff"/>
-                </a:solidFill>
-              </a:uFill>
-              <a:latin typeface="Times New Roman"/>
             </a:endParaRPr>
           </a:p>
         </p:txBody>
@@ -2013,14 +1847,14 @@
       </p:grpSpPr>
       <p:sp>
         <p:nvSpPr>
-          <p:cNvPr id="39" name="CustomShape 1"/>
+          <p:cNvPr id="36" name="CustomShape 1"/>
           <p:cNvSpPr/>
           <p:nvPr/>
         </p:nvSpPr>
         <p:spPr>
           <a:xfrm>
             <a:off x="3657600" y="2774160"/>
-            <a:ext cx="2377440" cy="457200"/>
+            <a:ext cx="2377080" cy="456840"/>
           </a:xfrm>
           <a:prstGeom prst="rect">
             <a:avLst/>
@@ -2042,9 +1876,198 @@
         <p:txBody>
           <a:bodyPr wrap="none" lIns="90000" rIns="90000" tIns="45000" bIns="45000" anchor="ctr"/>
           <a:p>
+            <a:pPr algn="ctr">
+              <a:lnSpc>
+                <a:spcPct val="100000"/>
+              </a:lnSpc>
+            </a:pPr>
+            <a:r>
+              <a:rPr b="0" lang="en-US" sz="1800" spc="-1" strike="noStrike">
+                <a:solidFill>
+                  <a:srgbClr val="000000"/>
+                </a:solidFill>
+                <a:uFill>
+                  <a:solidFill>
+                    <a:srgbClr val="ffffff"/>
+                  </a:solidFill>
+                </a:uFill>
+                <a:latin typeface="Arial"/>
+                <a:ea typeface="DejaVu Sans"/>
+              </a:rPr>
+              <a:t>Bootstrap Frames</a:t>
+            </a:r>
+            <a:endParaRPr b="0" lang="en-US" sz="1800" spc="-1" strike="noStrike">
+              <a:solidFill>
+                <a:srgbClr val="000000"/>
+              </a:solidFill>
+              <a:uFill>
+                <a:solidFill>
+                  <a:srgbClr val="ffffff"/>
+                </a:solidFill>
+              </a:uFill>
+              <a:latin typeface="Arial"/>
+            </a:endParaRPr>
+          </a:p>
+        </p:txBody>
+      </p:sp>
+      <p:sp>
+        <p:nvSpPr>
+          <p:cNvPr id="37" name="CustomShape 2"/>
+          <p:cNvSpPr/>
+          <p:nvPr/>
+        </p:nvSpPr>
+        <p:spPr>
+          <a:xfrm>
+            <a:off x="3657600" y="4330800"/>
+            <a:ext cx="2377080" cy="456840"/>
+          </a:xfrm>
+          <a:prstGeom prst="rect">
+            <a:avLst/>
+          </a:prstGeom>
+          <a:noFill/>
+          <a:ln w="18360">
+            <a:solidFill>
+              <a:srgbClr val="000000"/>
+            </a:solidFill>
+            <a:round/>
+          </a:ln>
+        </p:spPr>
+        <p:style>
+          <a:lnRef idx="0"/>
+          <a:fillRef idx="0"/>
+          <a:effectRef idx="0"/>
+          <a:fontRef idx="minor"/>
+        </p:style>
+        <p:txBody>
+          <a:bodyPr wrap="none" lIns="90000" rIns="90000" tIns="45000" bIns="45000" anchor="ctr"/>
+          <a:p>
+            <a:pPr algn="ctr">
+              <a:lnSpc>
+                <a:spcPct val="100000"/>
+              </a:lnSpc>
+            </a:pPr>
+            <a:r>
+              <a:rPr b="0" lang="en-US" sz="1800" spc="-1" strike="noStrike">
+                <a:solidFill>
+                  <a:srgbClr val="000000"/>
+                </a:solidFill>
+                <a:uFill>
+                  <a:solidFill>
+                    <a:srgbClr val="ffffff"/>
+                  </a:solidFill>
+                </a:uFill>
+                <a:latin typeface="Arial"/>
+                <a:ea typeface="DejaVu Sans"/>
+              </a:rPr>
+              <a:t>Initialization</a:t>
+            </a:r>
+            <a:endParaRPr b="0" lang="en-US" sz="1800" spc="-1" strike="noStrike">
+              <a:solidFill>
+                <a:srgbClr val="000000"/>
+              </a:solidFill>
+              <a:uFill>
+                <a:solidFill>
+                  <a:srgbClr val="ffffff"/>
+                </a:solidFill>
+              </a:uFill>
+              <a:latin typeface="Arial"/>
+            </a:endParaRPr>
+          </a:p>
+        </p:txBody>
+      </p:sp>
+      <p:sp>
+        <p:nvSpPr>
+          <p:cNvPr id="38" name="CustomShape 3"/>
+          <p:cNvSpPr/>
+          <p:nvPr/>
+        </p:nvSpPr>
+        <p:spPr>
+          <a:xfrm>
+            <a:off x="3657600" y="5940000"/>
+            <a:ext cx="2377080" cy="456840"/>
+          </a:xfrm>
+          <a:prstGeom prst="rect">
+            <a:avLst/>
+          </a:prstGeom>
+          <a:noFill/>
+          <a:ln w="18360">
+            <a:solidFill>
+              <a:srgbClr val="000000"/>
+            </a:solidFill>
+            <a:round/>
+          </a:ln>
+        </p:spPr>
+        <p:style>
+          <a:lnRef idx="0"/>
+          <a:fillRef idx="0"/>
+          <a:effectRef idx="0"/>
+          <a:fontRef idx="minor"/>
+        </p:style>
+        <p:txBody>
+          <a:bodyPr wrap="none" lIns="90000" rIns="90000" tIns="45000" bIns="45000" anchor="ctr"/>
+          <a:p>
+            <a:pPr algn="ctr">
+              <a:lnSpc>
+                <a:spcPct val="100000"/>
+              </a:lnSpc>
+            </a:pPr>
+            <a:r>
+              <a:rPr b="0" lang="en-US" sz="1800" spc="-1" strike="noStrike">
+                <a:solidFill>
+                  <a:srgbClr val="000000"/>
+                </a:solidFill>
+                <a:uFill>
+                  <a:solidFill>
+                    <a:srgbClr val="ffffff"/>
+                  </a:solidFill>
+                </a:uFill>
+                <a:latin typeface="Arial"/>
+                <a:ea typeface="DejaVu Sans"/>
+              </a:rPr>
+              <a:t>Continuous Operation</a:t>
+            </a:r>
+            <a:endParaRPr b="0" lang="en-US" sz="1800" spc="-1" strike="noStrike">
+              <a:solidFill>
+                <a:srgbClr val="000000"/>
+              </a:solidFill>
+              <a:uFill>
+                <a:solidFill>
+                  <a:srgbClr val="ffffff"/>
+                </a:solidFill>
+              </a:uFill>
+              <a:latin typeface="Arial"/>
+            </a:endParaRPr>
+          </a:p>
+        </p:txBody>
+      </p:sp>
+      <p:cxnSp>
+        <p:nvCxnSpPr>
+          <p:cNvPr id="39" name="Line 4"/>
+          <p:cNvCxnSpPr/>
+          <p:nvPr/>
+        </p:nvCxnSpPr>
+        <p:spPr>
+          <a:xfrm>
+            <a:off x="0" y="0"/>
+            <a:ext cx="360" cy="360"/>
+          </a:xfrm>
+          <a:prstGeom prst="line">
+            <a:avLst/>
+          </a:prstGeom>
+          <a:ln w="18360">
+            <a:solidFill>
+              <a:srgbClr val="000000"/>
+            </a:solidFill>
+            <a:round/>
+            <a:tailEnd len="med" type="triangle" w="med"/>
+          </a:ln>
+        </p:spPr>
+        <p:txBody>
+          <a:bodyPr lIns="90000" rIns="90000" tIns="45000" bIns="45000" anchor="ctr"/>
+          <a:p>
             <a:pPr algn="ctr"/>
             <a:r>
-              <a:rPr b="0" lang="en-US" sz="1800" spc="-1" strike="noStrike">
+              <a:rPr b="0" lang="en-US" sz="1500" spc="-1" strike="noStrike">
                 <a:solidFill>
                   <a:srgbClr val="000000"/>
                 </a:solidFill>
@@ -2055,7 +2078,7 @@
                 </a:uFill>
                 <a:latin typeface="Arial"/>
               </a:rPr>
-              <a:t>Bootstrap Frames</a:t>
+              <a:t>Image 1 &amp; Image 2  </a:t>
             </a:r>
             <a:endParaRPr b="0" lang="en-US" sz="1800" spc="-1" strike="noStrike">
               <a:solidFill>
@@ -2070,41 +2093,35 @@
             </a:endParaRPr>
           </a:p>
         </p:txBody>
-      </p:sp>
-      <p:sp>
-        <p:nvSpPr>
-          <p:cNvPr id="40" name="CustomShape 2"/>
-          <p:cNvSpPr/>
+      </p:cxnSp>
+      <p:cxnSp>
+        <p:nvCxnSpPr>
+          <p:cNvPr id="40" name="Line 5"/>
+          <p:cNvCxnSpPr/>
           <p:nvPr/>
-        </p:nvSpPr>
-        <p:spPr>
-          <a:xfrm>
-            <a:off x="3657600" y="4330800"/>
-            <a:ext cx="2377440" cy="457200"/>
-          </a:xfrm>
-          <a:prstGeom prst="rect">
-            <a:avLst/>
-          </a:prstGeom>
-          <a:noFill/>
+        </p:nvCxnSpPr>
+        <p:spPr>
+          <a:xfrm>
+            <a:off x="0" y="0"/>
+            <a:ext cx="360" cy="360"/>
+          </a:xfrm>
+          <a:prstGeom prst="line">
+            <a:avLst/>
+          </a:prstGeom>
           <a:ln w="18360">
             <a:solidFill>
               <a:srgbClr val="000000"/>
             </a:solidFill>
             <a:round/>
+            <a:tailEnd len="med" type="triangle" w="med"/>
           </a:ln>
         </p:spPr>
-        <p:style>
-          <a:lnRef idx="0"/>
-          <a:fillRef idx="0"/>
-          <a:effectRef idx="0"/>
-          <a:fontRef idx="minor"/>
-        </p:style>
-        <p:txBody>
-          <a:bodyPr wrap="none" lIns="90000" rIns="90000" tIns="45000" bIns="45000" anchor="ctr"/>
+        <p:txBody>
+          <a:bodyPr lIns="90000" rIns="90000" tIns="45000" bIns="45000" anchor="ctr"/>
           <a:p>
             <a:pPr algn="ctr"/>
             <a:r>
-              <a:rPr b="0" lang="en-US" sz="1800" spc="-1" strike="noStrike">
+              <a:rPr b="0" lang="en-US" sz="1500" spc="-1" strike="noStrike">
                 <a:solidFill>
                   <a:srgbClr val="000000"/>
                 </a:solidFill>
@@ -2115,7 +2132,7 @@
                 </a:uFill>
                 <a:latin typeface="Arial"/>
               </a:rPr>
-              <a:t>Initialization</a:t>
+              <a:t>Initial Landmarks &amp; Keypoints  </a:t>
             </a:r>
             <a:endParaRPr b="0" lang="en-US" sz="1800" spc="-1" strike="noStrike">
               <a:solidFill>
@@ -2130,37 +2147,31 @@
             </a:endParaRPr>
           </a:p>
         </p:txBody>
-      </p:sp>
-      <p:sp>
-        <p:nvSpPr>
-          <p:cNvPr id="41" name="CustomShape 3"/>
-          <p:cNvSpPr/>
+      </p:cxnSp>
+      <p:cxnSp>
+        <p:nvCxnSpPr>
+          <p:cNvPr id="41" name="Line 6"/>
+          <p:cNvCxnSpPr/>
           <p:nvPr/>
-        </p:nvSpPr>
-        <p:spPr>
-          <a:xfrm>
-            <a:off x="3657600" y="5940000"/>
-            <a:ext cx="2377440" cy="457200"/>
-          </a:xfrm>
-          <a:prstGeom prst="rect">
-            <a:avLst/>
-          </a:prstGeom>
-          <a:noFill/>
+        </p:nvCxnSpPr>
+        <p:spPr>
+          <a:xfrm>
+            <a:off x="0" y="0"/>
+            <a:ext cx="360" cy="360"/>
+          </a:xfrm>
+          <a:prstGeom prst="line">
+            <a:avLst/>
+          </a:prstGeom>
           <a:ln w="18360">
             <a:solidFill>
               <a:srgbClr val="000000"/>
             </a:solidFill>
             <a:round/>
+            <a:tailEnd len="med" type="triangle" w="med"/>
           </a:ln>
         </p:spPr>
-        <p:style>
-          <a:lnRef idx="0"/>
-          <a:fillRef idx="0"/>
-          <a:effectRef idx="0"/>
-          <a:fontRef idx="minor"/>
-        </p:style>
-        <p:txBody>
-          <a:bodyPr wrap="none" lIns="90000" rIns="90000" tIns="45000" bIns="45000" anchor="ctr"/>
+        <p:txBody>
+          <a:bodyPr lIns="90000" rIns="90000" tIns="45000" bIns="45000" anchor="ctr"/>
           <a:p>
             <a:pPr algn="ctr"/>
             <a:r>
@@ -2175,48 +2186,8 @@
                 </a:uFill>
                 <a:latin typeface="Arial"/>
               </a:rPr>
-              <a:t>Continuous Operation</a:t>
+              <a:t>  </a:t>
             </a:r>
-            <a:endParaRPr b="0" lang="en-US" sz="1800" spc="-1" strike="noStrike">
-              <a:solidFill>
-                <a:srgbClr val="000000"/>
-              </a:solidFill>
-              <a:uFill>
-                <a:solidFill>
-                  <a:srgbClr val="ffffff"/>
-                </a:solidFill>
-              </a:uFill>
-              <a:latin typeface="Arial"/>
-            </a:endParaRPr>
-          </a:p>
-        </p:txBody>
-      </p:sp>
-      <p:cxnSp>
-        <p:nvCxnSpPr>
-          <p:cNvPr id="42" name="Line 4"/>
-          <p:cNvCxnSpPr/>
-          <p:nvPr/>
-        </p:nvCxnSpPr>
-        <p:spPr>
-          <a:xfrm>
-            <a:off x="0" y="0"/>
-            <a:ext cx="360" cy="360"/>
-          </a:xfrm>
-          <a:prstGeom prst="line">
-            <a:avLst/>
-          </a:prstGeom>
-          <a:ln w="18360">
-            <a:solidFill>
-              <a:srgbClr val="000000"/>
-            </a:solidFill>
-            <a:round/>
-            <a:tailEnd len="med" type="triangle" w="med"/>
-          </a:ln>
-        </p:spPr>
-        <p:txBody>
-          <a:bodyPr lIns="0" rIns="0" tIns="0" bIns="0" anchor="ctr"/>
-          <a:p>
-            <a:pPr algn="ctr"/>
             <a:r>
               <a:rPr b="0" lang="en-US" sz="1500" spc="-1" strike="noStrike">
                 <a:solidFill>
@@ -2229,78 +2200,10 @@
                 </a:uFill>
                 <a:latin typeface="Arial"/>
               </a:rPr>
-              <a:t>Dataset </a:t>
+              <a:t>Dataset</a:t>
             </a:r>
-            <a:endParaRPr b="0" lang="en-US" sz="1500" spc="-1" strike="noStrike">
-              <a:solidFill>
-                <a:srgbClr val="000000"/>
-              </a:solidFill>
-              <a:uFill>
-                <a:solidFill>
-                  <a:srgbClr val="ffffff"/>
-                </a:solidFill>
-              </a:uFill>
-              <a:latin typeface="Arial"/>
-            </a:endParaRPr>
-          </a:p>
-          <a:p>
-            <a:pPr algn="ctr"/>
-            <a:endParaRPr b="0" lang="en-US" sz="1500" spc="-1" strike="noStrike">
-              <a:solidFill>
-                <a:srgbClr val="000000"/>
-              </a:solidFill>
-              <a:uFill>
-                <a:solidFill>
-                  <a:srgbClr val="ffffff"/>
-                </a:solidFill>
-              </a:uFill>
-              <a:latin typeface="Arial"/>
-            </a:endParaRPr>
-          </a:p>
-          <a:p>
-            <a:pPr algn="ctr"/>
-            <a:endParaRPr b="0" lang="en-US" sz="1500" spc="-1" strike="noStrike">
-              <a:solidFill>
-                <a:srgbClr val="000000"/>
-              </a:solidFill>
-              <a:uFill>
-                <a:solidFill>
-                  <a:srgbClr val="ffffff"/>
-                </a:solidFill>
-              </a:uFill>
-              <a:latin typeface="Arial"/>
-            </a:endParaRPr>
-          </a:p>
-        </p:txBody>
-      </p:cxnSp>
-      <p:cxnSp>
-        <p:nvCxnSpPr>
-          <p:cNvPr id="43" name="Line 5"/>
-          <p:cNvCxnSpPr/>
-          <p:nvPr/>
-        </p:nvCxnSpPr>
-        <p:spPr>
-          <a:xfrm>
-            <a:off x="0" y="0"/>
-            <a:ext cx="360" cy="360"/>
-          </a:xfrm>
-          <a:prstGeom prst="line">
-            <a:avLst/>
-          </a:prstGeom>
-          <a:ln w="18360">
-            <a:solidFill>
-              <a:srgbClr val="000000"/>
-            </a:solidFill>
-            <a:round/>
-            <a:tailEnd len="med" type="triangle" w="med"/>
-          </a:ln>
-        </p:spPr>
-        <p:txBody>
-          <a:bodyPr lIns="0" rIns="0" tIns="0" bIns="0" anchor="ctr"/>
-          <a:p>
-            <a:pPr algn="ctr"/>
             <a:r>
-              <a:rPr b="0" lang="en-US" sz="1500" spc="-1" strike="noStrike">
+              <a:rPr b="0" lang="en-US" sz="1800" spc="-1" strike="noStrike">
                 <a:solidFill>
                   <a:srgbClr val="000000"/>
                 </a:solidFill>
@@ -2311,46 +2214,20 @@
                 </a:uFill>
                 <a:latin typeface="Arial"/>
               </a:rPr>
-              <a:t>Image 1 &amp; Image 2 </a:t>
+              <a:t>  </a:t>
             </a:r>
-            <a:endParaRPr b="0" lang="en-US" sz="1500" spc="-1" strike="noStrike">
-              <a:solidFill>
-                <a:srgbClr val="000000"/>
-              </a:solidFill>
-              <a:uFill>
-                <a:solidFill>
-                  <a:srgbClr val="ffffff"/>
-                </a:solidFill>
-              </a:uFill>
-              <a:latin typeface="Arial"/>
-            </a:endParaRPr>
-          </a:p>
-        </p:txBody>
-      </p:cxnSp>
-      <p:cxnSp>
-        <p:nvCxnSpPr>
-          <p:cNvPr id="44" name="Line 6"/>
-          <p:cNvCxnSpPr/>
-          <p:nvPr/>
-        </p:nvCxnSpPr>
-        <p:spPr>
-          <a:xfrm>
-            <a:off x="0" y="0"/>
-            <a:ext cx="360" cy="360"/>
-          </a:xfrm>
-          <a:prstGeom prst="line">
-            <a:avLst/>
-          </a:prstGeom>
-          <a:ln w="18360">
-            <a:solidFill>
-              <a:srgbClr val="000000"/>
-            </a:solidFill>
-            <a:round/>
-            <a:tailEnd len="med" type="triangle" w="med"/>
-          </a:ln>
-        </p:spPr>
-        <p:txBody>
-          <a:bodyPr lIns="0" rIns="0" tIns="0" bIns="0" anchor="ctr"/>
+            <a:endParaRPr b="0" lang="en-US" sz="1800" spc="-1" strike="noStrike">
+              <a:solidFill>
+                <a:srgbClr val="000000"/>
+              </a:solidFill>
+              <a:uFill>
+                <a:solidFill>
+                  <a:srgbClr val="ffffff"/>
+                </a:solidFill>
+              </a:uFill>
+              <a:latin typeface="Arial"/>
+            </a:endParaRPr>
+          </a:p>
           <a:p>
             <a:pPr algn="ctr"/>
             <a:r>
@@ -2367,6 +2244,60 @@
               </a:rPr>
               <a:t> </a:t>
             </a:r>
+            <a:endParaRPr b="0" lang="en-US" sz="1800" spc="-1" strike="noStrike">
+              <a:solidFill>
+                <a:srgbClr val="000000"/>
+              </a:solidFill>
+              <a:uFill>
+                <a:solidFill>
+                  <a:srgbClr val="ffffff"/>
+                </a:solidFill>
+              </a:uFill>
+              <a:latin typeface="Arial"/>
+            </a:endParaRPr>
+          </a:p>
+          <a:p>
+            <a:pPr algn="ctr"/>
+            <a:endParaRPr b="0" lang="en-US" sz="1800" spc="-1" strike="noStrike">
+              <a:solidFill>
+                <a:srgbClr val="000000"/>
+              </a:solidFill>
+              <a:uFill>
+                <a:solidFill>
+                  <a:srgbClr val="ffffff"/>
+                </a:solidFill>
+              </a:uFill>
+              <a:latin typeface="Arial"/>
+            </a:endParaRPr>
+          </a:p>
+        </p:txBody>
+      </p:cxnSp>
+      <p:cxnSp>
+        <p:nvCxnSpPr>
+          <p:cNvPr id="42" name="Line 7"/>
+          <p:cNvCxnSpPr/>
+          <p:nvPr/>
+        </p:nvCxnSpPr>
+        <p:spPr>
+          <a:xfrm>
+            <a:off x="0" y="0"/>
+            <a:ext cx="360" cy="360"/>
+          </a:xfrm>
+          <a:prstGeom prst="line">
+            <a:avLst/>
+          </a:prstGeom>
+          <a:ln w="18360">
+            <a:solidFill>
+              <a:srgbClr val="000000"/>
+            </a:solidFill>
+            <a:round/>
+            <a:tailEnd len="med" type="triangle" w="med"/>
+          </a:ln>
+        </p:spPr>
+        <p:txBody>
+          <a:bodyPr lIns="90000" rIns="90000" tIns="45000" bIns="45000" anchor="ctr"/>
+          <a:p>
+            <a:pPr algn="ctr"/>
             <a:r>
               <a:rPr b="0" lang="en-US" sz="1500" spc="-1" strike="noStrike">
                 <a:solidFill>
@@ -2379,8 +2310,22 @@
                 </a:uFill>
                 <a:latin typeface="Arial"/>
               </a:rPr>
-              <a:t>Initial Landmarks </a:t>
+              <a:t>Current Image</a:t>
             </a:r>
+            <a:endParaRPr b="0" lang="en-US" sz="1800" spc="-1" strike="noStrike">
+              <a:solidFill>
+                <a:srgbClr val="000000"/>
+              </a:solidFill>
+              <a:uFill>
+                <a:solidFill>
+                  <a:srgbClr val="ffffff"/>
+                </a:solidFill>
+              </a:uFill>
+              <a:latin typeface="Arial"/>
+            </a:endParaRPr>
+          </a:p>
+          <a:p>
+            <a:pPr algn="ctr"/>
             <a:endParaRPr b="0" lang="en-US" sz="1800" spc="-1" strike="noStrike">
               <a:solidFill>
                 <a:srgbClr val="000000"/>
@@ -2397,7 +2342,7 @@
       </p:cxnSp>
       <p:cxnSp>
         <p:nvCxnSpPr>
-          <p:cNvPr id="45" name="Line 7"/>
+          <p:cNvPr id="43" name="Line 8"/>
           <p:cNvCxnSpPr/>
           <p:nvPr/>
         </p:nvCxnSpPr>
@@ -2417,8 +2362,31 @@
             <a:tailEnd len="med" type="triangle" w="med"/>
           </a:ln>
         </p:spPr>
-        <p:txBody>
-          <a:bodyPr lIns="0" rIns="0" tIns="0" bIns="0" anchor="ctr"/>
+      </p:cxnSp>
+      <p:cxnSp>
+        <p:nvCxnSpPr>
+          <p:cNvPr id="44" name="Line 9"/>
+          <p:cNvCxnSpPr/>
+          <p:nvPr/>
+        </p:nvCxnSpPr>
+        <p:spPr>
+          <a:xfrm>
+            <a:off x="0" y="0"/>
+            <a:ext cx="360" cy="360"/>
+          </a:xfrm>
+          <a:prstGeom prst="line">
+            <a:avLst/>
+          </a:prstGeom>
+          <a:ln w="18360">
+            <a:solidFill>
+              <a:srgbClr val="000000"/>
+            </a:solidFill>
+            <a:round/>
+            <a:tailEnd len="med" type="triangle" w="med"/>
+          </a:ln>
+        </p:spPr>
+        <p:txBody>
+          <a:bodyPr lIns="90000" rIns="90000" tIns="45000" bIns="45000" anchor="ctr"/>
           <a:p>
             <a:pPr algn="ctr"/>
             <a:r>
@@ -2433,36 +2401,22 @@
                 </a:uFill>
                 <a:latin typeface="Arial"/>
               </a:rPr>
-              <a:t>Current Image </a:t>
+              <a:t>Transformation Matrix</a:t>
             </a:r>
-            <a:endParaRPr b="0" lang="en-US" sz="1800" spc="-1" strike="noStrike">
-              <a:solidFill>
-                <a:srgbClr val="000000"/>
-              </a:solidFill>
-              <a:uFill>
-                <a:solidFill>
-                  <a:srgbClr val="ffffff"/>
-                </a:solidFill>
-              </a:uFill>
-              <a:latin typeface="Arial"/>
-            </a:endParaRPr>
-          </a:p>
-          <a:p>
-            <a:pPr algn="ctr"/>
-            <a:endParaRPr b="0" lang="en-US" sz="1800" spc="-1" strike="noStrike">
-              <a:solidFill>
-                <a:srgbClr val="000000"/>
-              </a:solidFill>
-              <a:uFill>
-                <a:solidFill>
-                  <a:srgbClr val="ffffff"/>
-                </a:solidFill>
-              </a:uFill>
-              <a:latin typeface="Arial"/>
-            </a:endParaRPr>
-          </a:p>
-          <a:p>
-            <a:pPr algn="ctr"/>
+            <a:r>
+              <a:rPr b="0" lang="en-US" sz="1800" spc="-1" strike="noStrike">
+                <a:solidFill>
+                  <a:srgbClr val="000000"/>
+                </a:solidFill>
+                <a:uFill>
+                  <a:solidFill>
+                    <a:srgbClr val="ffffff"/>
+                  </a:solidFill>
+                </a:uFill>
+                <a:latin typeface="Arial"/>
+              </a:rPr>
+              <a:t>  </a:t>
+            </a:r>
             <a:endParaRPr b="0" lang="en-US" sz="1800" spc="-1" strike="noStrike">
               <a:solidFill>
                 <a:srgbClr val="000000"/>

</xml_diff>